<commit_message>
Little modifications on PPT
</commit_message>
<xml_diff>
--- a/JavaScript_Eloquent/EloquentJavaScript_Chapter-3.pptx
+++ b/JavaScript_Eloquent/EloquentJavaScript_Chapter-3.pptx
@@ -4564,7 +4564,23 @@
             </a:r>
             <a:r>
               <a:rPr lang="pt-PT" dirty="0"/>
-              <a:t>, porém há alguns casos onde a recursão pode tornar o código mais simples e claro, por exemplo em Estruturas Hierárquicas onde usar a recursão ao invés de loops torna o código mais legível e intuitivo, ou também em problemas matemáticos recursivos como por exemplo a factorização.</a:t>
+              <a:t>, porém há alguns casos onde a recursão pode tornar o código mais simples e claro, por exemplo em </a:t>
+            </a:r>
+            <a:r>
+              <a:rPr lang="pt-PT" i="1" dirty="0"/>
+              <a:t>Estruturas Hierárquicas</a:t>
+            </a:r>
+            <a:r>
+              <a:rPr lang="pt-PT" dirty="0"/>
+              <a:t> onde usar a recursão ao invés de </a:t>
+            </a:r>
+            <a:r>
+              <a:rPr lang="pt-PT" i="1" dirty="0"/>
+              <a:t>loops</a:t>
+            </a:r>
+            <a:r>
+              <a:rPr lang="pt-PT" dirty="0"/>
+              <a:t> torna o código mais legível e intuitivo, ou também em problemas matemáticos recursivos como por exemplo a factoração.</a:t>
             </a:r>
           </a:p>
         </p:txBody>

</xml_diff>